<commit_message>
removed name on Homework4 aka removed Eloy as it would require user and started the html to start the Homework 5
</commit_message>
<xml_diff>
--- a/Homework4/DecisionTree.pptx
+++ b/Homework4/DecisionTree.pptx
@@ -308,7 +308,7 @@
           <a:p>
             <a:fld id="{630F5BE5-B688-FF42-89B2-94D9E9242ADB}" type="datetimeFigureOut">
               <a:rPr lang="en-US" smtClean="0"/>
-              <a:t>10/17/16</a:t>
+              <a:t>10/21/16</a:t>
             </a:fld>
             <a:endParaRPr lang="en-US"/>
           </a:p>
@@ -478,7 +478,7 @@
           <a:p>
             <a:fld id="{630F5BE5-B688-FF42-89B2-94D9E9242ADB}" type="datetimeFigureOut">
               <a:rPr lang="en-US" smtClean="0"/>
-              <a:t>10/17/16</a:t>
+              <a:t>10/21/16</a:t>
             </a:fld>
             <a:endParaRPr lang="en-US"/>
           </a:p>
@@ -658,7 +658,7 @@
           <a:p>
             <a:fld id="{630F5BE5-B688-FF42-89B2-94D9E9242ADB}" type="datetimeFigureOut">
               <a:rPr lang="en-US" smtClean="0"/>
-              <a:t>10/17/16</a:t>
+              <a:t>10/21/16</a:t>
             </a:fld>
             <a:endParaRPr lang="en-US"/>
           </a:p>
@@ -828,7 +828,7 @@
           <a:p>
             <a:fld id="{630F5BE5-B688-FF42-89B2-94D9E9242ADB}" type="datetimeFigureOut">
               <a:rPr lang="en-US" smtClean="0"/>
-              <a:t>10/17/16</a:t>
+              <a:t>10/21/16</a:t>
             </a:fld>
             <a:endParaRPr lang="en-US"/>
           </a:p>
@@ -1074,7 +1074,7 @@
           <a:p>
             <a:fld id="{630F5BE5-B688-FF42-89B2-94D9E9242ADB}" type="datetimeFigureOut">
               <a:rPr lang="en-US" smtClean="0"/>
-              <a:t>10/17/16</a:t>
+              <a:t>10/21/16</a:t>
             </a:fld>
             <a:endParaRPr lang="en-US"/>
           </a:p>
@@ -1362,7 +1362,7 @@
           <a:p>
             <a:fld id="{630F5BE5-B688-FF42-89B2-94D9E9242ADB}" type="datetimeFigureOut">
               <a:rPr lang="en-US" smtClean="0"/>
-              <a:t>10/17/16</a:t>
+              <a:t>10/21/16</a:t>
             </a:fld>
             <a:endParaRPr lang="en-US"/>
           </a:p>
@@ -1784,7 +1784,7 @@
           <a:p>
             <a:fld id="{630F5BE5-B688-FF42-89B2-94D9E9242ADB}" type="datetimeFigureOut">
               <a:rPr lang="en-US" smtClean="0"/>
-              <a:t>10/17/16</a:t>
+              <a:t>10/21/16</a:t>
             </a:fld>
             <a:endParaRPr lang="en-US"/>
           </a:p>
@@ -1902,7 +1902,7 @@
           <a:p>
             <a:fld id="{630F5BE5-B688-FF42-89B2-94D9E9242ADB}" type="datetimeFigureOut">
               <a:rPr lang="en-US" smtClean="0"/>
-              <a:t>10/17/16</a:t>
+              <a:t>10/21/16</a:t>
             </a:fld>
             <a:endParaRPr lang="en-US"/>
           </a:p>
@@ -1997,7 +1997,7 @@
           <a:p>
             <a:fld id="{630F5BE5-B688-FF42-89B2-94D9E9242ADB}" type="datetimeFigureOut">
               <a:rPr lang="en-US" smtClean="0"/>
-              <a:t>10/17/16</a:t>
+              <a:t>10/21/16</a:t>
             </a:fld>
             <a:endParaRPr lang="en-US"/>
           </a:p>
@@ -2274,7 +2274,7 @@
           <a:p>
             <a:fld id="{630F5BE5-B688-FF42-89B2-94D9E9242ADB}" type="datetimeFigureOut">
               <a:rPr lang="en-US" smtClean="0"/>
-              <a:t>10/17/16</a:t>
+              <a:t>10/21/16</a:t>
             </a:fld>
             <a:endParaRPr lang="en-US"/>
           </a:p>
@@ -2527,7 +2527,7 @@
           <a:p>
             <a:fld id="{630F5BE5-B688-FF42-89B2-94D9E9242ADB}" type="datetimeFigureOut">
               <a:rPr lang="en-US" smtClean="0"/>
-              <a:t>10/17/16</a:t>
+              <a:t>10/21/16</a:t>
             </a:fld>
             <a:endParaRPr lang="en-US"/>
           </a:p>
@@ -2740,7 +2740,7 @@
           <a:p>
             <a:fld id="{630F5BE5-B688-FF42-89B2-94D9E9242ADB}" type="datetimeFigureOut">
               <a:rPr lang="en-US" smtClean="0"/>
-              <a:t>10/17/16</a:t>
+              <a:t>10/21/16</a:t>
             </a:fld>
             <a:endParaRPr lang="en-US"/>
           </a:p>
@@ -6845,7 +6845,6 @@
               <a:rPr lang="en-US" dirty="0"/>
               <a:t>With CART, everything that is said is "captioned" live for deaf and hard of hearing clients. In fact, it can be thought of as captioning for non-broadcast settings, such as classrooms, churches, meetings, and conferences.</a:t>
             </a:r>
-            <a:endParaRPr lang="en-US" dirty="0"/>
           </a:p>
         </p:txBody>
       </p:sp>
@@ -6874,7 +6873,6 @@
               <a:rPr lang="en-US" dirty="0"/>
               <a:t>Roger Pen transmits the speaker's voice directly into your ears. Cutting Edge Wireless microphone. Roger Pen features adaptive wireless transmission, fully automated settings, wideband audio Bluetooth for cell phone use, TV connectivity, and an audio input for listening to multimedia. Swiss premium quality product developed by Phonak, the world's leading hearing healthcare company.</a:t>
             </a:r>
-            <a:endParaRPr lang="en-US" dirty="0"/>
           </a:p>
         </p:txBody>
       </p:sp>
@@ -6959,7 +6957,7 @@
         <p:spPr>
           <a:xfrm>
             <a:off x="458671" y="1478835"/>
-            <a:ext cx="2857561" cy="523220"/>
+            <a:ext cx="1906755" cy="523220"/>
           </a:xfrm>
           <a:prstGeom prst="rect">
             <a:avLst/>
@@ -6973,21 +6971,14 @@
           <a:lstStyle/>
           <a:p>
             <a:r>
-              <a:rPr lang="en-US" sz="2800" b="1" dirty="0" smtClean="0">
+              <a:rPr lang="en-US" sz="2800" b="1" smtClean="0">
                 <a:latin typeface="Avenir Black"/>
                 <a:cs typeface="Avenir Black"/>
               </a:rPr>
-              <a:t>Welcome, </a:t>
-            </a:r>
-            <a:r>
-              <a:rPr lang="en-US" sz="2800" b="1" dirty="0" err="1" smtClean="0">
-                <a:latin typeface="Avenir Black"/>
-                <a:cs typeface="Avenir Black"/>
-              </a:rPr>
-              <a:t>Eloy</a:t>
-            </a:r>
-            <a:r>
-              <a:rPr lang="en-US" sz="2800" b="1" dirty="0" smtClean="0">
+              <a:t>Welcome</a:t>
+            </a:r>
+            <a:r>
+              <a:rPr lang="en-US" sz="2800" b="1">
                 <a:latin typeface="Avenir Black"/>
                 <a:cs typeface="Avenir Black"/>
               </a:rPr>
@@ -7552,7 +7543,6 @@
               <a:rPr lang="en-US" dirty="0" smtClean="0"/>
               <a:t>Outlet rechargeable  </a:t>
             </a:r>
-            <a:endParaRPr lang="en-US" dirty="0" smtClean="0"/>
           </a:p>
         </p:txBody>
       </p:sp>
@@ -8193,7 +8183,6 @@
               <a:rPr lang="en-US" dirty="0" smtClean="0"/>
               <a:t>Brooklyn NY 12345</a:t>
             </a:r>
-            <a:endParaRPr lang="en-US" dirty="0" smtClean="0"/>
           </a:p>
         </p:txBody>
       </p:sp>
@@ -8341,7 +8330,6 @@
               <a:rPr lang="en-US" dirty="0"/>
               <a:t> Q90 </a:t>
             </a:r>
-            <a:endParaRPr lang="en-US" dirty="0"/>
           </a:p>
         </p:txBody>
       </p:sp>
@@ -9024,7 +9012,6 @@
               <a:rPr lang="en-US" dirty="0"/>
               <a:t>With CART, everything that is said is "captioned" live for deaf and hard of hearing clients. In fact, it can be thought of as captioning for non-broadcast settings, such as classrooms, churches, meetings, and conferences.</a:t>
             </a:r>
-            <a:endParaRPr lang="en-US" dirty="0"/>
           </a:p>
         </p:txBody>
       </p:sp>
@@ -9053,7 +9040,6 @@
               <a:rPr lang="en-US" dirty="0"/>
               <a:t>Roger Pen transmits the speaker's voice directly into your ears. Cutting Edge Wireless microphone. Roger Pen features adaptive wireless transmission, fully automated settings, wideband audio Bluetooth for cell phone use, TV connectivity, and an audio input for listening to multimedia. Swiss premium quality product developed by Phonak, the world's leading hearing healthcare company.</a:t>
             </a:r>
-            <a:endParaRPr lang="en-US" dirty="0"/>
           </a:p>
         </p:txBody>
       </p:sp>
@@ -9142,10 +9128,6 @@
               </a:rPr>
               <a:t>Try another date or item.   </a:t>
             </a:r>
-            <a:endParaRPr lang="en-US" sz="2800" b="1" dirty="0">
-              <a:latin typeface="Avenir Black"/>
-              <a:cs typeface="Avenir Black"/>
-            </a:endParaRPr>
           </a:p>
         </p:txBody>
       </p:sp>

</xml_diff>